<commit_message>
Fix issue #43 and #39 and increase version number to ensure major changes are reflected appropriately. Update img folder based on new methods
</commit_message>
<xml_diff>
--- a/img/typeOfContinouusCalibration.pptx
+++ b/img/typeOfContinouusCalibration.pptx
@@ -255,7 +255,7 @@
           <a:p>
             <a:fld id="{21AFAA02-F400-4C31-9ED2-009D36B15956}" type="datetimeFigureOut">
               <a:rPr lang="de-DE" smtClean="0"/>
-              <a:t>11.12.2019</a:t>
+              <a:t>19.12.2019</a:t>
             </a:fld>
             <a:endParaRPr lang="de-DE"/>
           </a:p>
@@ -425,7 +425,7 @@
           <a:p>
             <a:fld id="{21AFAA02-F400-4C31-9ED2-009D36B15956}" type="datetimeFigureOut">
               <a:rPr lang="de-DE" smtClean="0"/>
-              <a:t>11.12.2019</a:t>
+              <a:t>19.12.2019</a:t>
             </a:fld>
             <a:endParaRPr lang="de-DE"/>
           </a:p>
@@ -605,7 +605,7 @@
           <a:p>
             <a:fld id="{21AFAA02-F400-4C31-9ED2-009D36B15956}" type="datetimeFigureOut">
               <a:rPr lang="de-DE" smtClean="0"/>
-              <a:t>11.12.2019</a:t>
+              <a:t>19.12.2019</a:t>
             </a:fld>
             <a:endParaRPr lang="de-DE"/>
           </a:p>
@@ -775,7 +775,7 @@
           <a:p>
             <a:fld id="{21AFAA02-F400-4C31-9ED2-009D36B15956}" type="datetimeFigureOut">
               <a:rPr lang="de-DE" smtClean="0"/>
-              <a:t>11.12.2019</a:t>
+              <a:t>19.12.2019</a:t>
             </a:fld>
             <a:endParaRPr lang="de-DE"/>
           </a:p>
@@ -1019,7 +1019,7 @@
           <a:p>
             <a:fld id="{21AFAA02-F400-4C31-9ED2-009D36B15956}" type="datetimeFigureOut">
               <a:rPr lang="de-DE" smtClean="0"/>
-              <a:t>11.12.2019</a:t>
+              <a:t>19.12.2019</a:t>
             </a:fld>
             <a:endParaRPr lang="de-DE"/>
           </a:p>
@@ -1251,7 +1251,7 @@
           <a:p>
             <a:fld id="{21AFAA02-F400-4C31-9ED2-009D36B15956}" type="datetimeFigureOut">
               <a:rPr lang="de-DE" smtClean="0"/>
-              <a:t>11.12.2019</a:t>
+              <a:t>19.12.2019</a:t>
             </a:fld>
             <a:endParaRPr lang="de-DE"/>
           </a:p>
@@ -1618,7 +1618,7 @@
           <a:p>
             <a:fld id="{21AFAA02-F400-4C31-9ED2-009D36B15956}" type="datetimeFigureOut">
               <a:rPr lang="de-DE" smtClean="0"/>
-              <a:t>11.12.2019</a:t>
+              <a:t>19.12.2019</a:t>
             </a:fld>
             <a:endParaRPr lang="de-DE"/>
           </a:p>
@@ -1736,7 +1736,7 @@
           <a:p>
             <a:fld id="{21AFAA02-F400-4C31-9ED2-009D36B15956}" type="datetimeFigureOut">
               <a:rPr lang="de-DE" smtClean="0"/>
-              <a:t>11.12.2019</a:t>
+              <a:t>19.12.2019</a:t>
             </a:fld>
             <a:endParaRPr lang="de-DE"/>
           </a:p>
@@ -1831,7 +1831,7 @@
           <a:p>
             <a:fld id="{21AFAA02-F400-4C31-9ED2-009D36B15956}" type="datetimeFigureOut">
               <a:rPr lang="de-DE" smtClean="0"/>
-              <a:t>11.12.2019</a:t>
+              <a:t>19.12.2019</a:t>
             </a:fld>
             <a:endParaRPr lang="de-DE"/>
           </a:p>
@@ -2108,7 +2108,7 @@
           <a:p>
             <a:fld id="{21AFAA02-F400-4C31-9ED2-009D36B15956}" type="datetimeFigureOut">
               <a:rPr lang="de-DE" smtClean="0"/>
-              <a:t>11.12.2019</a:t>
+              <a:t>19.12.2019</a:t>
             </a:fld>
             <a:endParaRPr lang="de-DE"/>
           </a:p>
@@ -2365,7 +2365,7 @@
           <a:p>
             <a:fld id="{21AFAA02-F400-4C31-9ED2-009D36B15956}" type="datetimeFigureOut">
               <a:rPr lang="de-DE" smtClean="0"/>
-              <a:t>11.12.2019</a:t>
+              <a:t>19.12.2019</a:t>
             </a:fld>
             <a:endParaRPr lang="de-DE"/>
           </a:p>
@@ -2578,7 +2578,7 @@
           <a:p>
             <a:fld id="{21AFAA02-F400-4C31-9ED2-009D36B15956}" type="datetimeFigureOut">
               <a:rPr lang="de-DE" smtClean="0"/>
-              <a:t>11.12.2019</a:t>
+              <a:t>19.12.2019</a:t>
             </a:fld>
             <a:endParaRPr lang="de-DE"/>
           </a:p>
@@ -3026,7 +3026,7 @@
         </p:nvSpPr>
         <p:spPr>
           <a:xfrm>
-            <a:off x="2889183" y="4355791"/>
+            <a:off x="2889183" y="8865651"/>
             <a:ext cx="2570419" cy="461665"/>
           </a:xfrm>
           <a:prstGeom prst="rect">
@@ -3888,7 +3888,7 @@
         </p:nvCxnSpPr>
         <p:spPr>
           <a:xfrm>
-            <a:off x="872987" y="4001795"/>
+            <a:off x="872987" y="8511655"/>
             <a:ext cx="11275976" cy="0"/>
           </a:xfrm>
           <a:prstGeom prst="line">
@@ -3926,7 +3926,7 @@
         </p:nvCxnSpPr>
         <p:spPr>
           <a:xfrm>
-            <a:off x="872987" y="4798350"/>
+            <a:off x="872987" y="9308210"/>
             <a:ext cx="11275976" cy="0"/>
           </a:xfrm>
           <a:prstGeom prst="line">
@@ -3956,44 +3956,6 @@
           </a:fontRef>
         </p:style>
       </p:cxnSp>
-      <p:cxnSp>
-        <p:nvCxnSpPr>
-          <p:cNvPr id="41" name="Gerader Verbinder 40"/>
-          <p:cNvCxnSpPr/>
-          <p:nvPr/>
-        </p:nvCxnSpPr>
-        <p:spPr>
-          <a:xfrm>
-            <a:off x="872987" y="5617530"/>
-            <a:ext cx="11275976" cy="0"/>
-          </a:xfrm>
-          <a:prstGeom prst="line">
-            <a:avLst/>
-          </a:prstGeom>
-          <a:ln w="12700">
-            <a:solidFill>
-              <a:schemeClr val="bg1">
-                <a:lumMod val="65000"/>
-              </a:schemeClr>
-            </a:solidFill>
-            <a:prstDash val="dash"/>
-          </a:ln>
-        </p:spPr>
-        <p:style>
-          <a:lnRef idx="1">
-            <a:schemeClr val="dk1"/>
-          </a:lnRef>
-          <a:fillRef idx="0">
-            <a:schemeClr val="dk1"/>
-          </a:fillRef>
-          <a:effectRef idx="0">
-            <a:schemeClr val="dk1"/>
-          </a:effectRef>
-          <a:fontRef idx="minor">
-            <a:schemeClr val="tx1"/>
-          </a:fontRef>
-        </p:style>
-      </p:cxnSp>
       <p:sp>
         <p:nvSpPr>
           <p:cNvPr id="42" name="Textfeld 41"/>
@@ -4002,7 +3964,7 @@
         </p:nvSpPr>
         <p:spPr>
           <a:xfrm>
-            <a:off x="854134" y="4183273"/>
+            <a:off x="854134" y="8693133"/>
             <a:ext cx="2231136" cy="369332"/>
           </a:xfrm>
           <a:prstGeom prst="rect">
@@ -4032,7 +3994,7 @@
         </p:nvSpPr>
         <p:spPr>
           <a:xfrm>
-            <a:off x="854134" y="5772670"/>
+            <a:off x="854134" y="5661299"/>
             <a:ext cx="1149870" cy="369332"/>
           </a:xfrm>
           <a:prstGeom prst="rect">
@@ -4062,7 +4024,7 @@
         </p:nvCxnSpPr>
         <p:spPr>
           <a:xfrm>
-            <a:off x="872987" y="7248961"/>
+            <a:off x="872987" y="11091247"/>
             <a:ext cx="11275976" cy="0"/>
           </a:xfrm>
           <a:prstGeom prst="line">
@@ -4100,7 +4062,7 @@
         </p:nvCxnSpPr>
         <p:spPr>
           <a:xfrm>
-            <a:off x="872987" y="8099861"/>
+            <a:off x="872987" y="3721134"/>
             <a:ext cx="11275976" cy="0"/>
           </a:xfrm>
           <a:prstGeom prst="line">
@@ -4138,7 +4100,7 @@
         </p:nvSpPr>
         <p:spPr>
           <a:xfrm>
-            <a:off x="854134" y="4935339"/>
+            <a:off x="854134" y="9445199"/>
             <a:ext cx="2231136" cy="369332"/>
           </a:xfrm>
           <a:prstGeom prst="rect">
@@ -4162,58 +4124,14 @@
       </p:sp>
       <p:sp>
         <p:nvSpPr>
-          <p:cNvPr id="68" name="Textfeld 67"/>
-          <p:cNvSpPr txBox="1"/>
-          <p:nvPr/>
-        </p:nvSpPr>
-        <p:spPr>
-          <a:xfrm>
-            <a:off x="853435" y="7337102"/>
-            <a:ext cx="2231136" cy="646331"/>
-          </a:xfrm>
-          <a:prstGeom prst="rect">
-            <a:avLst/>
-          </a:prstGeom>
-          <a:noFill/>
-        </p:spPr>
-        <p:txBody>
-          <a:bodyPr wrap="square" rtlCol="0">
-            <a:spAutoFit/>
-          </a:bodyPr>
-          <a:lstStyle/>
-          <a:p>
-            <a:r>
-              <a:rPr lang="en-US" dirty="0" smtClean="0"/>
-              <a:t>Simple</a:t>
-            </a:r>
-          </a:p>
-          <a:p>
-            <a:r>
-              <a:rPr lang="en-US" dirty="0" smtClean="0"/>
-              <a:t>(</a:t>
-            </a:r>
-            <a:r>
-              <a:rPr lang="en-US" dirty="0" err="1" smtClean="0"/>
-              <a:t>Timedelta</a:t>
-            </a:r>
-            <a:r>
-              <a:rPr lang="en-US" dirty="0" smtClean="0"/>
-              <a:t>=0)</a:t>
-            </a:r>
-            <a:endParaRPr lang="en-US" dirty="0"/>
-          </a:p>
-        </p:txBody>
-      </p:sp>
-      <p:sp>
-        <p:nvSpPr>
-          <p:cNvPr id="70" name="Pfeil nach rechts 69"/>
+          <p:cNvPr id="75" name="Pfeil nach rechts 74"/>
           <p:cNvSpPr/>
           <p:nvPr/>
         </p:nvSpPr>
         <p:spPr>
           <a:xfrm>
-            <a:off x="2435656" y="7274243"/>
-            <a:ext cx="9756345" cy="369332"/>
+            <a:off x="2410967" y="8540606"/>
+            <a:ext cx="1588313" cy="369332"/>
           </a:xfrm>
           <a:prstGeom prst="rightArrow">
             <a:avLst/>
@@ -4259,14 +4177,14 @@
       </p:sp>
       <p:sp>
         <p:nvSpPr>
-          <p:cNvPr id="71" name="Pfeil nach rechts 70"/>
+          <p:cNvPr id="76" name="Pfeil nach rechts 75"/>
           <p:cNvSpPr/>
           <p:nvPr/>
         </p:nvSpPr>
         <p:spPr>
           <a:xfrm>
-            <a:off x="3974593" y="10274948"/>
-            <a:ext cx="4337941" cy="369332"/>
+            <a:off x="4010607" y="8540606"/>
+            <a:ext cx="1625449" cy="369332"/>
           </a:xfrm>
           <a:prstGeom prst="rightArrow">
             <a:avLst/>
@@ -4312,14 +4230,14 @@
       </p:sp>
       <p:sp>
         <p:nvSpPr>
-          <p:cNvPr id="75" name="Pfeil nach rechts 74"/>
+          <p:cNvPr id="77" name="Pfeil nach rechts 76"/>
           <p:cNvSpPr/>
           <p:nvPr/>
         </p:nvSpPr>
         <p:spPr>
           <a:xfrm>
-            <a:off x="2410967" y="4030746"/>
-            <a:ext cx="1588313" cy="369332"/>
+            <a:off x="5636055" y="8540606"/>
+            <a:ext cx="1295734" cy="369332"/>
           </a:xfrm>
           <a:prstGeom prst="rightArrow">
             <a:avLst/>
@@ -4365,14 +4283,14 @@
       </p:sp>
       <p:sp>
         <p:nvSpPr>
-          <p:cNvPr id="76" name="Pfeil nach rechts 75"/>
+          <p:cNvPr id="78" name="Pfeil nach rechts 77"/>
           <p:cNvSpPr/>
           <p:nvPr/>
         </p:nvSpPr>
         <p:spPr>
           <a:xfrm>
-            <a:off x="4010607" y="4030746"/>
-            <a:ext cx="1625449" cy="369332"/>
+            <a:off x="6943646" y="8540606"/>
+            <a:ext cx="1356059" cy="369332"/>
           </a:xfrm>
           <a:prstGeom prst="rightArrow">
             <a:avLst/>
@@ -4418,14 +4336,14 @@
       </p:sp>
       <p:sp>
         <p:nvSpPr>
-          <p:cNvPr id="77" name="Pfeil nach rechts 76"/>
+          <p:cNvPr id="79" name="Pfeil nach rechts 78"/>
           <p:cNvSpPr/>
           <p:nvPr/>
         </p:nvSpPr>
         <p:spPr>
           <a:xfrm>
-            <a:off x="5636055" y="4030746"/>
-            <a:ext cx="1295734" cy="369332"/>
+            <a:off x="8326803" y="8540606"/>
+            <a:ext cx="3813581" cy="369332"/>
           </a:xfrm>
           <a:prstGeom prst="rightArrow">
             <a:avLst/>
@@ -4471,14 +4389,14 @@
       </p:sp>
       <p:sp>
         <p:nvSpPr>
-          <p:cNvPr id="78" name="Pfeil nach rechts 77"/>
+          <p:cNvPr id="80" name="Pfeil nach rechts 79"/>
           <p:cNvSpPr/>
           <p:nvPr/>
         </p:nvSpPr>
         <p:spPr>
           <a:xfrm>
-            <a:off x="6943646" y="4030746"/>
-            <a:ext cx="1356059" cy="369332"/>
+            <a:off x="2410967" y="9301772"/>
+            <a:ext cx="1588313" cy="369332"/>
           </a:xfrm>
           <a:prstGeom prst="rightArrow">
             <a:avLst/>
@@ -4524,14 +4442,14 @@
       </p:sp>
       <p:sp>
         <p:nvSpPr>
-          <p:cNvPr id="79" name="Pfeil nach rechts 78"/>
+          <p:cNvPr id="83" name="Pfeil nach rechts 82"/>
           <p:cNvSpPr/>
           <p:nvPr/>
         </p:nvSpPr>
         <p:spPr>
           <a:xfrm>
-            <a:off x="8326803" y="4030746"/>
-            <a:ext cx="3813581" cy="369332"/>
+            <a:off x="3974592" y="9408386"/>
+            <a:ext cx="1661464" cy="369332"/>
           </a:xfrm>
           <a:prstGeom prst="rightArrow">
             <a:avLst/>
@@ -4577,14 +4495,14 @@
       </p:sp>
       <p:sp>
         <p:nvSpPr>
-          <p:cNvPr id="80" name="Pfeil nach rechts 79"/>
+          <p:cNvPr id="84" name="Pfeil nach rechts 83"/>
           <p:cNvSpPr/>
           <p:nvPr/>
         </p:nvSpPr>
         <p:spPr>
           <a:xfrm>
-            <a:off x="2410967" y="4791912"/>
-            <a:ext cx="1588313" cy="369332"/>
+            <a:off x="5624275" y="9498728"/>
+            <a:ext cx="1294687" cy="369332"/>
           </a:xfrm>
           <a:prstGeom prst="rightArrow">
             <a:avLst/>
@@ -4630,14 +4548,14 @@
       </p:sp>
       <p:sp>
         <p:nvSpPr>
-          <p:cNvPr id="83" name="Pfeil nach rechts 82"/>
+          <p:cNvPr id="85" name="Pfeil nach rechts 84"/>
           <p:cNvSpPr/>
           <p:nvPr/>
         </p:nvSpPr>
         <p:spPr>
           <a:xfrm>
-            <a:off x="3974592" y="4898526"/>
-            <a:ext cx="1661464" cy="369332"/>
+            <a:off x="6918960" y="9620674"/>
+            <a:ext cx="1406554" cy="369332"/>
           </a:xfrm>
           <a:prstGeom prst="rightArrow">
             <a:avLst/>
@@ -4683,119 +4601,13 @@
       </p:sp>
       <p:sp>
         <p:nvSpPr>
-          <p:cNvPr id="84" name="Pfeil nach rechts 83"/>
-          <p:cNvSpPr/>
-          <p:nvPr/>
-        </p:nvSpPr>
-        <p:spPr>
-          <a:xfrm>
-            <a:off x="5624275" y="4988868"/>
-            <a:ext cx="1294687" cy="369332"/>
-          </a:xfrm>
-          <a:prstGeom prst="rightArrow">
-            <a:avLst/>
-          </a:prstGeom>
-          <a:solidFill>
-            <a:srgbClr val="FF0000"/>
-          </a:solidFill>
-          <a:ln>
-            <a:solidFill>
-              <a:schemeClr val="tx1"/>
-            </a:solidFill>
-          </a:ln>
-        </p:spPr>
-        <p:style>
-          <a:lnRef idx="2">
-            <a:schemeClr val="accent1">
-              <a:shade val="50000"/>
-            </a:schemeClr>
-          </a:lnRef>
-          <a:fillRef idx="1">
-            <a:schemeClr val="accent1"/>
-          </a:fillRef>
-          <a:effectRef idx="0">
-            <a:schemeClr val="accent1"/>
-          </a:effectRef>
-          <a:fontRef idx="minor">
-            <a:schemeClr val="lt1"/>
-          </a:fontRef>
-        </p:style>
-        <p:txBody>
-          <a:bodyPr rot="0" spcFirstLastPara="0" vertOverflow="overflow" horzOverflow="overflow" vert="horz" wrap="square" lIns="91440" tIns="45720" rIns="91440" bIns="45720" numCol="1" spcCol="0" rtlCol="0" fromWordArt="0" anchor="ctr" anchorCtr="0" forceAA="0" compatLnSpc="1">
-            <a:prstTxWarp prst="textNoShape">
-              <a:avLst/>
-            </a:prstTxWarp>
-            <a:noAutofit/>
-          </a:bodyPr>
-          <a:lstStyle/>
-          <a:p>
-            <a:pPr algn="ctr"/>
-            <a:endParaRPr lang="en-US" dirty="0"/>
-          </a:p>
-        </p:txBody>
-      </p:sp>
-      <p:sp>
-        <p:nvSpPr>
-          <p:cNvPr id="85" name="Pfeil nach rechts 84"/>
-          <p:cNvSpPr/>
-          <p:nvPr/>
-        </p:nvSpPr>
-        <p:spPr>
-          <a:xfrm>
-            <a:off x="6918960" y="5110814"/>
-            <a:ext cx="1406554" cy="369332"/>
-          </a:xfrm>
-          <a:prstGeom prst="rightArrow">
-            <a:avLst/>
-          </a:prstGeom>
-          <a:solidFill>
-            <a:srgbClr val="FF0000"/>
-          </a:solidFill>
-          <a:ln>
-            <a:solidFill>
-              <a:schemeClr val="tx1"/>
-            </a:solidFill>
-          </a:ln>
-        </p:spPr>
-        <p:style>
-          <a:lnRef idx="2">
-            <a:schemeClr val="accent1">
-              <a:shade val="50000"/>
-            </a:schemeClr>
-          </a:lnRef>
-          <a:fillRef idx="1">
-            <a:schemeClr val="accent1"/>
-          </a:fillRef>
-          <a:effectRef idx="0">
-            <a:schemeClr val="accent1"/>
-          </a:effectRef>
-          <a:fontRef idx="minor">
-            <a:schemeClr val="lt1"/>
-          </a:fontRef>
-        </p:style>
-        <p:txBody>
-          <a:bodyPr rot="0" spcFirstLastPara="0" vertOverflow="overflow" horzOverflow="overflow" vert="horz" wrap="square" lIns="91440" tIns="45720" rIns="91440" bIns="45720" numCol="1" spcCol="0" rtlCol="0" fromWordArt="0" anchor="ctr" anchorCtr="0" forceAA="0" compatLnSpc="1">
-            <a:prstTxWarp prst="textNoShape">
-              <a:avLst/>
-            </a:prstTxWarp>
-            <a:noAutofit/>
-          </a:bodyPr>
-          <a:lstStyle/>
-          <a:p>
-            <a:pPr algn="ctr"/>
-            <a:endParaRPr lang="en-US" dirty="0"/>
-          </a:p>
-        </p:txBody>
-      </p:sp>
-      <p:sp>
-        <p:nvSpPr>
           <p:cNvPr id="86" name="Pfeil nach rechts 85"/>
           <p:cNvSpPr/>
           <p:nvPr/>
         </p:nvSpPr>
         <p:spPr>
           <a:xfrm>
-            <a:off x="8299704" y="5248198"/>
+            <a:off x="8299704" y="9758058"/>
             <a:ext cx="3892294" cy="369332"/>
           </a:xfrm>
           <a:prstGeom prst="rightArrow">
@@ -4896,23 +4708,7 @@
                   <a:sysClr val="windowText" lastClr="000000"/>
                 </a:solidFill>
               </a:rPr>
-              <a:t>Start and end point </a:t>
-            </a:r>
-            <a:r>
-              <a:rPr lang="en-US" dirty="0" smtClean="0">
-                <a:solidFill>
-                  <a:sysClr val="windowText" lastClr="000000"/>
-                </a:solidFill>
-              </a:rPr>
-              <a:t>of s</a:t>
-            </a:r>
-            <a:r>
-              <a:rPr lang="en-US" dirty="0" smtClean="0">
-                <a:solidFill>
-                  <a:sysClr val="windowText" lastClr="000000"/>
-                </a:solidFill>
-              </a:rPr>
-              <a:t>imulation</a:t>
+              <a:t>Start and end point of simulation</a:t>
             </a:r>
             <a:endParaRPr lang="en-US" dirty="0">
               <a:solidFill>
@@ -4997,7 +4793,7 @@
         </p:nvSpPr>
         <p:spPr>
           <a:xfrm>
-            <a:off x="2422674" y="4996595"/>
+            <a:off x="2422674" y="9506455"/>
             <a:ext cx="1538937" cy="182408"/>
           </a:xfrm>
           <a:prstGeom prst="rect">
@@ -5052,7 +4848,7 @@
         </p:nvSpPr>
         <p:spPr>
           <a:xfrm>
-            <a:off x="2422674" y="5087104"/>
+            <a:off x="2422674" y="9596964"/>
             <a:ext cx="3188695" cy="182408"/>
           </a:xfrm>
           <a:prstGeom prst="rect">
@@ -5107,7 +4903,7 @@
         </p:nvSpPr>
         <p:spPr>
           <a:xfrm>
-            <a:off x="2422673" y="5203333"/>
+            <a:off x="2422673" y="9713193"/>
             <a:ext cx="4509115" cy="182408"/>
           </a:xfrm>
           <a:prstGeom prst="rect">
@@ -5162,7 +4958,7 @@
         </p:nvSpPr>
         <p:spPr>
           <a:xfrm>
-            <a:off x="2422673" y="5330840"/>
+            <a:off x="2422673" y="9840700"/>
             <a:ext cx="5877031" cy="182408"/>
           </a:xfrm>
           <a:prstGeom prst="rect">
@@ -5217,7 +5013,7 @@
         </p:nvSpPr>
         <p:spPr>
           <a:xfrm>
-            <a:off x="2410966" y="5632987"/>
+            <a:off x="2410966" y="5521616"/>
             <a:ext cx="1550644" cy="369332"/>
           </a:xfrm>
           <a:prstGeom prst="rightArrow">
@@ -5270,7 +5066,7 @@
         </p:nvSpPr>
         <p:spPr>
           <a:xfrm>
-            <a:off x="2089979" y="5719036"/>
+            <a:off x="2089979" y="5607665"/>
             <a:ext cx="320987" cy="182408"/>
           </a:xfrm>
           <a:prstGeom prst="rect">
@@ -5325,7 +5121,7 @@
         </p:nvSpPr>
         <p:spPr>
           <a:xfrm>
-            <a:off x="5290382" y="5720355"/>
+            <a:off x="5290382" y="5608984"/>
             <a:ext cx="320987" cy="182408"/>
           </a:xfrm>
           <a:prstGeom prst="rect">
@@ -5380,7 +5176,7 @@
         </p:nvSpPr>
         <p:spPr>
           <a:xfrm>
-            <a:off x="6585148" y="6056425"/>
+            <a:off x="6585148" y="5945054"/>
             <a:ext cx="320987" cy="182408"/>
           </a:xfrm>
           <a:prstGeom prst="rect">
@@ -5435,7 +5231,7 @@
         </p:nvSpPr>
         <p:spPr>
           <a:xfrm>
-            <a:off x="7965891" y="5697914"/>
+            <a:off x="7965891" y="5586543"/>
             <a:ext cx="320987" cy="182408"/>
           </a:xfrm>
           <a:prstGeom prst="rect">
@@ -5490,7 +5286,7 @@
         </p:nvSpPr>
         <p:spPr>
           <a:xfrm>
-            <a:off x="5605877" y="5634306"/>
+            <a:off x="5605877" y="5522935"/>
             <a:ext cx="1337769" cy="369332"/>
           </a:xfrm>
           <a:prstGeom prst="rightArrow">
@@ -5543,7 +5339,7 @@
         </p:nvSpPr>
         <p:spPr>
           <a:xfrm>
-            <a:off x="8299703" y="5612112"/>
+            <a:off x="8299703" y="5500741"/>
             <a:ext cx="3871981" cy="369332"/>
           </a:xfrm>
           <a:prstGeom prst="rightArrow">
@@ -5596,7 +5392,7 @@
         </p:nvSpPr>
         <p:spPr>
           <a:xfrm>
-            <a:off x="6931788" y="5957595"/>
+            <a:off x="6931788" y="5846224"/>
             <a:ext cx="1367915" cy="369332"/>
           </a:xfrm>
           <a:prstGeom prst="rightArrow">
@@ -5649,7 +5445,7 @@
         </p:nvSpPr>
         <p:spPr>
           <a:xfrm>
-            <a:off x="3640779" y="6056425"/>
+            <a:off x="3640779" y="5945054"/>
             <a:ext cx="320987" cy="182408"/>
           </a:xfrm>
           <a:prstGeom prst="rect">
@@ -5704,7 +5500,7 @@
         </p:nvSpPr>
         <p:spPr>
           <a:xfrm>
-            <a:off x="3967491" y="5957595"/>
+            <a:off x="3967491" y="5846224"/>
             <a:ext cx="1638385" cy="369332"/>
           </a:xfrm>
           <a:prstGeom prst="rightArrow">
@@ -5749,171 +5545,6 @@
           </a:p>
         </p:txBody>
       </p:sp>
-      <p:sp>
-        <p:nvSpPr>
-          <p:cNvPr id="105" name="Rechteck 104"/>
-          <p:cNvSpPr/>
-          <p:nvPr/>
-        </p:nvSpPr>
-        <p:spPr>
-          <a:xfrm>
-            <a:off x="6931787" y="7367705"/>
-            <a:ext cx="1355090" cy="182408"/>
-          </a:xfrm>
-          <a:prstGeom prst="rect">
-            <a:avLst/>
-          </a:prstGeom>
-          <a:solidFill>
-            <a:schemeClr val="bg1">
-              <a:lumMod val="85000"/>
-            </a:schemeClr>
-          </a:solidFill>
-          <a:ln>
-            <a:solidFill>
-              <a:schemeClr val="tx1"/>
-            </a:solidFill>
-          </a:ln>
-        </p:spPr>
-        <p:style>
-          <a:lnRef idx="2">
-            <a:schemeClr val="accent1">
-              <a:shade val="50000"/>
-            </a:schemeClr>
-          </a:lnRef>
-          <a:fillRef idx="1">
-            <a:schemeClr val="accent1"/>
-          </a:fillRef>
-          <a:effectRef idx="0">
-            <a:schemeClr val="accent1"/>
-          </a:effectRef>
-          <a:fontRef idx="minor">
-            <a:schemeClr val="lt1"/>
-          </a:fontRef>
-        </p:style>
-        <p:txBody>
-          <a:bodyPr rot="0" spcFirstLastPara="0" vertOverflow="overflow" horzOverflow="overflow" vert="horz" wrap="square" lIns="91440" tIns="45720" rIns="91440" bIns="45720" numCol="1" spcCol="0" rtlCol="0" fromWordArt="0" anchor="ctr" anchorCtr="0" forceAA="0" compatLnSpc="1">
-            <a:prstTxWarp prst="textNoShape">
-              <a:avLst/>
-            </a:prstTxWarp>
-            <a:noAutofit/>
-          </a:bodyPr>
-          <a:lstStyle/>
-          <a:p>
-            <a:pPr algn="ctr"/>
-            <a:endParaRPr lang="en-US" dirty="0"/>
-          </a:p>
-        </p:txBody>
-      </p:sp>
-      <p:sp>
-        <p:nvSpPr>
-          <p:cNvPr id="106" name="Rechteck 105"/>
-          <p:cNvSpPr/>
-          <p:nvPr/>
-        </p:nvSpPr>
-        <p:spPr>
-          <a:xfrm>
-            <a:off x="3969102" y="7367705"/>
-            <a:ext cx="1636773" cy="182408"/>
-          </a:xfrm>
-          <a:prstGeom prst="rect">
-            <a:avLst/>
-          </a:prstGeom>
-          <a:solidFill>
-            <a:schemeClr val="bg1">
-              <a:lumMod val="85000"/>
-            </a:schemeClr>
-          </a:solidFill>
-          <a:ln>
-            <a:solidFill>
-              <a:schemeClr val="tx1"/>
-            </a:solidFill>
-          </a:ln>
-        </p:spPr>
-        <p:style>
-          <a:lnRef idx="2">
-            <a:schemeClr val="accent1">
-              <a:shade val="50000"/>
-            </a:schemeClr>
-          </a:lnRef>
-          <a:fillRef idx="1">
-            <a:schemeClr val="accent1"/>
-          </a:fillRef>
-          <a:effectRef idx="0">
-            <a:schemeClr val="accent1"/>
-          </a:effectRef>
-          <a:fontRef idx="minor">
-            <a:schemeClr val="lt1"/>
-          </a:fontRef>
-        </p:style>
-        <p:txBody>
-          <a:bodyPr rot="0" spcFirstLastPara="0" vertOverflow="overflow" horzOverflow="overflow" vert="horz" wrap="square" lIns="91440" tIns="45720" rIns="91440" bIns="45720" numCol="1" spcCol="0" rtlCol="0" fromWordArt="0" anchor="ctr" anchorCtr="0" forceAA="0" compatLnSpc="1">
-            <a:prstTxWarp prst="textNoShape">
-              <a:avLst/>
-            </a:prstTxWarp>
-            <a:noAutofit/>
-          </a:bodyPr>
-          <a:lstStyle/>
-          <a:p>
-            <a:pPr algn="ctr"/>
-            <a:endParaRPr lang="en-US" dirty="0"/>
-          </a:p>
-        </p:txBody>
-      </p:sp>
-      <p:sp>
-        <p:nvSpPr>
-          <p:cNvPr id="107" name="Rechteck 106"/>
-          <p:cNvSpPr/>
-          <p:nvPr/>
-        </p:nvSpPr>
-        <p:spPr>
-          <a:xfrm>
-            <a:off x="5616864" y="10368410"/>
-            <a:ext cx="1296607" cy="182408"/>
-          </a:xfrm>
-          <a:prstGeom prst="rect">
-            <a:avLst/>
-          </a:prstGeom>
-          <a:solidFill>
-            <a:schemeClr val="bg1">
-              <a:lumMod val="85000"/>
-            </a:schemeClr>
-          </a:solidFill>
-          <a:ln>
-            <a:solidFill>
-              <a:schemeClr val="tx1"/>
-            </a:solidFill>
-          </a:ln>
-        </p:spPr>
-        <p:style>
-          <a:lnRef idx="2">
-            <a:schemeClr val="accent1">
-              <a:shade val="50000"/>
-            </a:schemeClr>
-          </a:lnRef>
-          <a:fillRef idx="1">
-            <a:schemeClr val="accent1"/>
-          </a:fillRef>
-          <a:effectRef idx="0">
-            <a:schemeClr val="accent1"/>
-          </a:effectRef>
-          <a:fontRef idx="minor">
-            <a:schemeClr val="lt1"/>
-          </a:fontRef>
-        </p:style>
-        <p:txBody>
-          <a:bodyPr rot="0" spcFirstLastPara="0" vertOverflow="overflow" horzOverflow="overflow" vert="horz" wrap="square" lIns="91440" tIns="45720" rIns="91440" bIns="45720" numCol="1" spcCol="0" rtlCol="0" fromWordArt="0" anchor="ctr" anchorCtr="0" forceAA="0" compatLnSpc="1">
-            <a:prstTxWarp prst="textNoShape">
-              <a:avLst/>
-            </a:prstTxWarp>
-            <a:noAutofit/>
-          </a:bodyPr>
-          <a:lstStyle/>
-          <a:p>
-            <a:pPr algn="ctr"/>
-            <a:endParaRPr lang="en-US" dirty="0"/>
-          </a:p>
-        </p:txBody>
-      </p:sp>
       <p:cxnSp>
         <p:nvCxnSpPr>
           <p:cNvPr id="108" name="Gerader Verbinder 107"/>
@@ -5922,7 +5553,7 @@
         </p:nvCxnSpPr>
         <p:spPr>
           <a:xfrm>
-            <a:off x="872987" y="8949164"/>
+            <a:off x="872987" y="4570437"/>
             <a:ext cx="11275976" cy="0"/>
           </a:xfrm>
           <a:prstGeom prst="line">
@@ -5960,7 +5591,7 @@
         </p:nvSpPr>
         <p:spPr>
           <a:xfrm>
-            <a:off x="854134" y="8351689"/>
+            <a:off x="854134" y="3972962"/>
             <a:ext cx="2231136" cy="369332"/>
           </a:xfrm>
           <a:prstGeom prst="rect">
@@ -5990,7 +5621,7 @@
         </p:nvCxnSpPr>
         <p:spPr>
           <a:xfrm>
-            <a:off x="872987" y="9820423"/>
+            <a:off x="872987" y="5441696"/>
             <a:ext cx="11275976" cy="0"/>
           </a:xfrm>
           <a:prstGeom prst="line">
@@ -6028,7 +5659,7 @@
         </p:nvSpPr>
         <p:spPr>
           <a:xfrm>
-            <a:off x="854134" y="9222948"/>
+            <a:off x="854134" y="4844221"/>
             <a:ext cx="1349530" cy="369332"/>
           </a:xfrm>
           <a:prstGeom prst="rect">
@@ -6058,7 +5689,7 @@
         </p:nvCxnSpPr>
         <p:spPr>
           <a:xfrm>
-            <a:off x="872987" y="10749891"/>
+            <a:off x="872987" y="6371164"/>
             <a:ext cx="11275976" cy="0"/>
           </a:xfrm>
           <a:prstGeom prst="line">
@@ -6090,44 +5721,14 @@
       </p:cxnSp>
       <p:sp>
         <p:nvSpPr>
-          <p:cNvPr id="113" name="Textfeld 112"/>
-          <p:cNvSpPr txBox="1"/>
-          <p:nvPr/>
-        </p:nvSpPr>
-        <p:spPr>
-          <a:xfrm>
-            <a:off x="854134" y="10074250"/>
-            <a:ext cx="1483684" cy="369332"/>
-          </a:xfrm>
-          <a:prstGeom prst="rect">
-            <a:avLst/>
-          </a:prstGeom>
-          <a:noFill/>
-        </p:spPr>
-        <p:txBody>
-          <a:bodyPr wrap="square" rtlCol="0">
-            <a:spAutoFit/>
-          </a:bodyPr>
-          <a:lstStyle/>
-          <a:p>
-            <a:r>
-              <a:rPr lang="en-US" dirty="0" smtClean="0"/>
-              <a:t>Loop</a:t>
-            </a:r>
-            <a:endParaRPr lang="en-US" dirty="0"/>
-          </a:p>
-        </p:txBody>
-      </p:sp>
-      <p:sp>
-        <p:nvSpPr>
           <p:cNvPr id="124" name="Rechteck 123"/>
           <p:cNvSpPr/>
           <p:nvPr/>
         </p:nvSpPr>
         <p:spPr>
           <a:xfrm>
-            <a:off x="0" y="4001795"/>
-            <a:ext cx="854134" cy="2325132"/>
+            <a:off x="0" y="8511655"/>
+            <a:ext cx="854134" cy="1615735"/>
           </a:xfrm>
           <a:prstGeom prst="rect">
             <a:avLst/>
@@ -6180,73 +5781,13 @@
       </p:sp>
       <p:sp>
         <p:nvSpPr>
-          <p:cNvPr id="125" name="Rechteck 124"/>
-          <p:cNvSpPr/>
-          <p:nvPr/>
-        </p:nvSpPr>
-        <p:spPr>
-          <a:xfrm>
-            <a:off x="0" y="7284969"/>
-            <a:ext cx="854134" cy="3464922"/>
-          </a:xfrm>
-          <a:prstGeom prst="rect">
-            <a:avLst/>
-          </a:prstGeom>
-          <a:solidFill>
-            <a:srgbClr val="D9D9D9"/>
-          </a:solidFill>
-          <a:ln>
-            <a:solidFill>
-              <a:srgbClr val="D9D9D9"/>
-            </a:solidFill>
-          </a:ln>
-        </p:spPr>
-        <p:style>
-          <a:lnRef idx="2">
-            <a:schemeClr val="accent1">
-              <a:shade val="50000"/>
-            </a:schemeClr>
-          </a:lnRef>
-          <a:fillRef idx="1">
-            <a:schemeClr val="accent1"/>
-          </a:fillRef>
-          <a:effectRef idx="0">
-            <a:schemeClr val="accent1"/>
-          </a:effectRef>
-          <a:fontRef idx="minor">
-            <a:schemeClr val="lt1"/>
-          </a:fontRef>
-        </p:style>
-        <p:txBody>
-          <a:bodyPr vert="vert270" rtlCol="0" anchor="ctr"/>
-          <a:lstStyle/>
-          <a:p>
-            <a:pPr algn="ctr"/>
-            <a:r>
-              <a:rPr lang="en-US" dirty="0" smtClean="0">
-                <a:solidFill>
-                  <a:sysClr val="windowText" lastClr="000000"/>
-                </a:solidFill>
-              </a:rPr>
-              <a:t>Parallel</a:t>
-            </a:r>
-            <a:endParaRPr lang="en-US" dirty="0">
-              <a:solidFill>
-                <a:sysClr val="windowText" lastClr="000000"/>
-              </a:solidFill>
-            </a:endParaRPr>
-          </a:p>
-        </p:txBody>
-      </p:sp>
-      <p:sp>
-        <p:nvSpPr>
           <p:cNvPr id="132" name="Pfeil nach rechts 131"/>
           <p:cNvSpPr/>
           <p:nvPr/>
         </p:nvSpPr>
         <p:spPr>
           <a:xfrm>
-            <a:off x="2435656" y="8145501"/>
+            <a:off x="2435656" y="3766774"/>
             <a:ext cx="9756345" cy="369332"/>
           </a:xfrm>
           <a:prstGeom prst="rightArrow">
@@ -6299,7 +5840,7 @@
         </p:nvSpPr>
         <p:spPr>
           <a:xfrm>
-            <a:off x="2422673" y="8576505"/>
+            <a:off x="2422673" y="4197778"/>
             <a:ext cx="5889861" cy="369332"/>
           </a:xfrm>
           <a:prstGeom prst="rightArrow">
@@ -6352,7 +5893,7 @@
         </p:nvSpPr>
         <p:spPr>
           <a:xfrm>
-            <a:off x="6931787" y="8238963"/>
+            <a:off x="6931787" y="3860236"/>
             <a:ext cx="1355090" cy="182408"/>
           </a:xfrm>
           <a:prstGeom prst="rect">
@@ -6407,7 +5948,7 @@
         </p:nvSpPr>
         <p:spPr>
           <a:xfrm>
-            <a:off x="3969102" y="8238963"/>
+            <a:off x="3969102" y="3860236"/>
             <a:ext cx="1636773" cy="182408"/>
           </a:xfrm>
           <a:prstGeom prst="rect">
@@ -6462,7 +6003,7 @@
         </p:nvSpPr>
         <p:spPr>
           <a:xfrm>
-            <a:off x="5616864" y="8669967"/>
+            <a:off x="5616864" y="4291240"/>
             <a:ext cx="1296607" cy="182408"/>
           </a:xfrm>
           <a:prstGeom prst="rect">
@@ -6517,8 +6058,8 @@
         </p:nvSpPr>
         <p:spPr>
           <a:xfrm>
-            <a:off x="2417181" y="8669967"/>
-            <a:ext cx="1551918" cy="182408"/>
+            <a:off x="2004004" y="4291240"/>
+            <a:ext cx="1965095" cy="182408"/>
           </a:xfrm>
           <a:prstGeom prst="rect">
             <a:avLst/>
@@ -6572,7 +6113,7 @@
         </p:nvSpPr>
         <p:spPr>
           <a:xfrm>
-            <a:off x="2435656" y="8973523"/>
+            <a:off x="2435656" y="4594796"/>
             <a:ext cx="9756345" cy="369332"/>
           </a:xfrm>
           <a:prstGeom prst="rightArrow">
@@ -6625,7 +6166,7 @@
         </p:nvSpPr>
         <p:spPr>
           <a:xfrm>
-            <a:off x="3974593" y="9404527"/>
+            <a:off x="3974593" y="5025800"/>
             <a:ext cx="4337941" cy="369332"/>
           </a:xfrm>
           <a:prstGeom prst="rightArrow">
@@ -6678,7 +6219,7 @@
         </p:nvSpPr>
         <p:spPr>
           <a:xfrm>
-            <a:off x="6931787" y="9066985"/>
+            <a:off x="6931787" y="4688258"/>
             <a:ext cx="1355090" cy="182408"/>
           </a:xfrm>
           <a:prstGeom prst="rect">
@@ -6733,7 +6274,7 @@
         </p:nvSpPr>
         <p:spPr>
           <a:xfrm>
-            <a:off x="3969102" y="9066985"/>
+            <a:off x="3969102" y="4688258"/>
             <a:ext cx="1636773" cy="182408"/>
           </a:xfrm>
           <a:prstGeom prst="rect">
@@ -6788,7 +6329,7 @@
         </p:nvSpPr>
         <p:spPr>
           <a:xfrm>
-            <a:off x="5616864" y="9497989"/>
+            <a:off x="5616864" y="5119262"/>
             <a:ext cx="1296607" cy="182408"/>
           </a:xfrm>
           <a:prstGeom prst="rect">
@@ -6843,7 +6384,7 @@
         </p:nvSpPr>
         <p:spPr>
           <a:xfrm>
-            <a:off x="2114668" y="9074969"/>
+            <a:off x="2114668" y="4696242"/>
             <a:ext cx="320987" cy="182408"/>
           </a:xfrm>
           <a:prstGeom prst="rect">
@@ -6898,7 +6439,7 @@
         </p:nvSpPr>
         <p:spPr>
           <a:xfrm>
-            <a:off x="3637448" y="9497989"/>
+            <a:off x="3637448" y="5119262"/>
             <a:ext cx="320987" cy="182408"/>
           </a:xfrm>
           <a:prstGeom prst="rect">
@@ -6953,7 +6494,7 @@
         </p:nvSpPr>
         <p:spPr>
           <a:xfrm>
-            <a:off x="867040" y="6354979"/>
+            <a:off x="867040" y="10197265"/>
             <a:ext cx="11286248" cy="868700"/>
           </a:xfrm>
           <a:prstGeom prst="rect">
@@ -7003,13 +6544,8 @@
             </a:pPr>
             <a:r>
               <a:rPr lang="en-US" sz="1400" dirty="0" smtClean="0"/>
-              <a:t>Use them as initial values for next </a:t>
-            </a:r>
-            <a:r>
-              <a:rPr lang="en-US" sz="1400" dirty="0" smtClean="0"/>
-              <a:t>optimization</a:t>
-            </a:r>
-            <a:endParaRPr lang="en-US" sz="1400" dirty="0" smtClean="0"/>
+              <a:t>Use them as initial values for next optimization</a:t>
+            </a:r>
           </a:p>
         </p:txBody>
       </p:sp>
@@ -7021,7 +6557,7 @@
         </p:nvSpPr>
         <p:spPr>
           <a:xfrm>
-            <a:off x="879943" y="10761467"/>
+            <a:off x="879943" y="6382740"/>
             <a:ext cx="11286248" cy="848106"/>
           </a:xfrm>
           <a:prstGeom prst="rect">
@@ -7044,17 +6580,37 @@
           <a:p>
             <a:r>
               <a:rPr lang="en-US" sz="1400" dirty="0" smtClean="0"/>
-              <a:t>Simulate each type of class separate (</a:t>
-            </a:r>
-            <a:r>
-              <a:rPr lang="en-US" sz="1400" dirty="0" smtClean="0"/>
-              <a:t>if possible in parallel).</a:t>
+              <a:t>Simulate each type of class separate (if possible in parallel).</a:t>
             </a:r>
           </a:p>
           <a:p>
             <a:r>
               <a:rPr lang="en-US" sz="1400" b="1" dirty="0" smtClean="0"/>
-              <a:t>WARNING is raised if </a:t>
+              <a:t>WARNING </a:t>
+            </a:r>
+            <a:r>
+              <a:rPr lang="en-US" sz="1400" b="1" dirty="0" smtClean="0"/>
+              <a:t>is </a:t>
+            </a:r>
+            <a:r>
+              <a:rPr lang="en-US" sz="1400" b="1" dirty="0" smtClean="0"/>
+              <a:t>raised </a:t>
+            </a:r>
+            <a:r>
+              <a:rPr lang="en-US" sz="1400" b="1" dirty="0" smtClean="0"/>
+              <a:t>and Violin Plot </a:t>
+            </a:r>
+            <a:r>
+              <a:rPr lang="en-US" sz="1400" b="1" dirty="0" err="1" smtClean="0"/>
+              <a:t>createad</a:t>
+            </a:r>
+            <a:r>
+              <a:rPr lang="en-US" sz="1400" b="1" dirty="0" smtClean="0"/>
+              <a:t> </a:t>
+            </a:r>
+            <a:r>
+              <a:rPr lang="en-US" sz="1400" b="1" dirty="0" smtClean="0"/>
+              <a:t>if </a:t>
             </a:r>
             <a:r>
               <a:rPr lang="en-US" sz="1400" b="1" dirty="0" smtClean="0"/>
@@ -7066,15 +6622,19 @@
             </a:r>
             <a:r>
               <a:rPr lang="en-US" sz="1400" b="1" dirty="0" smtClean="0"/>
-              <a:t> have an </a:t>
+              <a:t> have an intersection. </a:t>
             </a:r>
             <a:r>
               <a:rPr lang="en-US" sz="1400" b="1" dirty="0" smtClean="0"/>
-              <a:t>intersection</a:t>
+              <a:t>(Averaging </a:t>
             </a:r>
             <a:r>
               <a:rPr lang="en-US" sz="1400" b="1" dirty="0" smtClean="0"/>
-              <a:t>. Averaging may not always make sense, see next slide!</a:t>
+              <a:t>may not always make sense, see next slide</a:t>
+            </a:r>
+            <a:r>
+              <a:rPr lang="en-US" sz="1400" b="1" dirty="0" smtClean="0"/>
+              <a:t>!)</a:t>
             </a:r>
             <a:endParaRPr lang="en-US" sz="1400" b="1" dirty="0"/>
           </a:p>
@@ -7088,7 +6648,7 @@
         </p:nvSpPr>
         <p:spPr>
           <a:xfrm>
-            <a:off x="5290381" y="6367456"/>
+            <a:off x="5247701" y="10238721"/>
             <a:ext cx="6850001" cy="762673"/>
           </a:xfrm>
           <a:prstGeom prst="rect">
@@ -7256,11 +6816,6 @@
               </a:rPr>
               <a:t>optimal values for one parameter in model</a:t>
             </a:r>
-            <a:endParaRPr lang="en-US" sz="1400" b="1" dirty="0">
-              <a:solidFill>
-                <a:schemeClr val="tx1"/>
-              </a:solidFill>
-            </a:endParaRPr>
           </a:p>
         </p:txBody>
       </p:sp>
@@ -7272,7 +6827,7 @@
         </p:nvSpPr>
         <p:spPr>
           <a:xfrm rot="16200000">
-            <a:off x="3930285" y="3308686"/>
+            <a:off x="3930285" y="7818546"/>
             <a:ext cx="73632" cy="2109150"/>
           </a:xfrm>
           <a:prstGeom prst="rightBrace">
@@ -7307,430 +6862,6 @@
           <a:p>
             <a:pPr algn="ctr"/>
             <a:endParaRPr lang="de-DE"/>
-          </a:p>
-        </p:txBody>
-      </p:sp>
-      <p:sp>
-        <p:nvSpPr>
-          <p:cNvPr id="89" name="Pfeil nach rechts 88"/>
-          <p:cNvSpPr/>
-          <p:nvPr/>
-        </p:nvSpPr>
-        <p:spPr>
-          <a:xfrm>
-            <a:off x="2435656" y="9817512"/>
-            <a:ext cx="9657383" cy="369332"/>
-          </a:xfrm>
-          <a:prstGeom prst="rightArrow">
-            <a:avLst/>
-          </a:prstGeom>
-          <a:solidFill>
-            <a:srgbClr val="FF0000"/>
-          </a:solidFill>
-          <a:ln>
-            <a:solidFill>
-              <a:schemeClr val="tx1"/>
-            </a:solidFill>
-          </a:ln>
-        </p:spPr>
-        <p:style>
-          <a:lnRef idx="2">
-            <a:schemeClr val="accent1">
-              <a:shade val="50000"/>
-            </a:schemeClr>
-          </a:lnRef>
-          <a:fillRef idx="1">
-            <a:schemeClr val="accent1"/>
-          </a:fillRef>
-          <a:effectRef idx="0">
-            <a:schemeClr val="accent1"/>
-          </a:effectRef>
-          <a:fontRef idx="minor">
-            <a:schemeClr val="lt1"/>
-          </a:fontRef>
-        </p:style>
-        <p:txBody>
-          <a:bodyPr rot="0" spcFirstLastPara="0" vertOverflow="overflow" horzOverflow="overflow" vert="horz" wrap="square" lIns="91440" tIns="45720" rIns="91440" bIns="45720" numCol="1" spcCol="0" rtlCol="0" fromWordArt="0" anchor="ctr" anchorCtr="0" forceAA="0" compatLnSpc="1">
-            <a:prstTxWarp prst="textNoShape">
-              <a:avLst/>
-            </a:prstTxWarp>
-            <a:noAutofit/>
-          </a:bodyPr>
-          <a:lstStyle/>
-          <a:p>
-            <a:pPr algn="ctr"/>
-            <a:endParaRPr lang="en-US" dirty="0"/>
-          </a:p>
-        </p:txBody>
-      </p:sp>
-      <p:sp>
-        <p:nvSpPr>
-          <p:cNvPr id="114" name="Rechteck 113"/>
-          <p:cNvSpPr/>
-          <p:nvPr/>
-        </p:nvSpPr>
-        <p:spPr>
-          <a:xfrm>
-            <a:off x="6931787" y="9910974"/>
-            <a:ext cx="1355090" cy="182408"/>
-          </a:xfrm>
-          <a:prstGeom prst="rect">
-            <a:avLst/>
-          </a:prstGeom>
-          <a:solidFill>
-            <a:schemeClr val="bg1">
-              <a:lumMod val="85000"/>
-            </a:schemeClr>
-          </a:solidFill>
-          <a:ln>
-            <a:solidFill>
-              <a:schemeClr val="tx1"/>
-            </a:solidFill>
-          </a:ln>
-        </p:spPr>
-        <p:style>
-          <a:lnRef idx="2">
-            <a:schemeClr val="accent1">
-              <a:shade val="50000"/>
-            </a:schemeClr>
-          </a:lnRef>
-          <a:fillRef idx="1">
-            <a:schemeClr val="accent1"/>
-          </a:fillRef>
-          <a:effectRef idx="0">
-            <a:schemeClr val="accent1"/>
-          </a:effectRef>
-          <a:fontRef idx="minor">
-            <a:schemeClr val="lt1"/>
-          </a:fontRef>
-        </p:style>
-        <p:txBody>
-          <a:bodyPr rot="0" spcFirstLastPara="0" vertOverflow="overflow" horzOverflow="overflow" vert="horz" wrap="square" lIns="91440" tIns="45720" rIns="91440" bIns="45720" numCol="1" spcCol="0" rtlCol="0" fromWordArt="0" anchor="ctr" anchorCtr="0" forceAA="0" compatLnSpc="1">
-            <a:prstTxWarp prst="textNoShape">
-              <a:avLst/>
-            </a:prstTxWarp>
-            <a:noAutofit/>
-          </a:bodyPr>
-          <a:lstStyle/>
-          <a:p>
-            <a:pPr algn="ctr"/>
-            <a:endParaRPr lang="en-US" dirty="0"/>
-          </a:p>
-        </p:txBody>
-      </p:sp>
-      <p:sp>
-        <p:nvSpPr>
-          <p:cNvPr id="115" name="Rechteck 114"/>
-          <p:cNvSpPr/>
-          <p:nvPr/>
-        </p:nvSpPr>
-        <p:spPr>
-          <a:xfrm>
-            <a:off x="3969102" y="9910974"/>
-            <a:ext cx="1636773" cy="182408"/>
-          </a:xfrm>
-          <a:prstGeom prst="rect">
-            <a:avLst/>
-          </a:prstGeom>
-          <a:solidFill>
-            <a:schemeClr val="bg1">
-              <a:lumMod val="85000"/>
-            </a:schemeClr>
-          </a:solidFill>
-          <a:ln>
-            <a:solidFill>
-              <a:schemeClr val="tx1"/>
-            </a:solidFill>
-          </a:ln>
-        </p:spPr>
-        <p:style>
-          <a:lnRef idx="2">
-            <a:schemeClr val="accent1">
-              <a:shade val="50000"/>
-            </a:schemeClr>
-          </a:lnRef>
-          <a:fillRef idx="1">
-            <a:schemeClr val="accent1"/>
-          </a:fillRef>
-          <a:effectRef idx="0">
-            <a:schemeClr val="accent1"/>
-          </a:effectRef>
-          <a:fontRef idx="minor">
-            <a:schemeClr val="lt1"/>
-          </a:fontRef>
-        </p:style>
-        <p:txBody>
-          <a:bodyPr rot="0" spcFirstLastPara="0" vertOverflow="overflow" horzOverflow="overflow" vert="horz" wrap="square" lIns="91440" tIns="45720" rIns="91440" bIns="45720" numCol="1" spcCol="0" rtlCol="0" fromWordArt="0" anchor="ctr" anchorCtr="0" forceAA="0" compatLnSpc="1">
-            <a:prstTxWarp prst="textNoShape">
-              <a:avLst/>
-            </a:prstTxWarp>
-            <a:noAutofit/>
-          </a:bodyPr>
-          <a:lstStyle/>
-          <a:p>
-            <a:pPr algn="ctr"/>
-            <a:endParaRPr lang="en-US" dirty="0"/>
-          </a:p>
-        </p:txBody>
-      </p:sp>
-      <p:cxnSp>
-        <p:nvCxnSpPr>
-          <p:cNvPr id="6" name="Gewinkelter Verbinder 5"/>
-          <p:cNvCxnSpPr>
-            <a:stCxn id="89" idx="3"/>
-            <a:endCxn id="71" idx="1"/>
-          </p:cNvCxnSpPr>
-          <p:nvPr/>
-        </p:nvCxnSpPr>
-        <p:spPr>
-          <a:xfrm flipH="1">
-            <a:off x="3974593" y="10002178"/>
-            <a:ext cx="8118446" cy="457436"/>
-          </a:xfrm>
-          <a:prstGeom prst="bentConnector5">
-            <a:avLst>
-              <a:gd name="adj1" fmla="val -587"/>
-              <a:gd name="adj2" fmla="val 50000"/>
-              <a:gd name="adj3" fmla="val 117482"/>
-            </a:avLst>
-          </a:prstGeom>
-          <a:ln>
-            <a:solidFill>
-              <a:schemeClr val="tx1"/>
-            </a:solidFill>
-            <a:tailEnd type="triangle"/>
-          </a:ln>
-        </p:spPr>
-        <p:style>
-          <a:lnRef idx="1">
-            <a:schemeClr val="accent1"/>
-          </a:lnRef>
-          <a:fillRef idx="0">
-            <a:schemeClr val="accent1"/>
-          </a:fillRef>
-          <a:effectRef idx="0">
-            <a:schemeClr val="accent1"/>
-          </a:effectRef>
-          <a:fontRef idx="minor">
-            <a:schemeClr val="tx1"/>
-          </a:fontRef>
-        </p:style>
-      </p:cxnSp>
-      <p:sp>
-        <p:nvSpPr>
-          <p:cNvPr id="31" name="Textfeld 30"/>
-          <p:cNvSpPr txBox="1"/>
-          <p:nvPr/>
-        </p:nvSpPr>
-        <p:spPr>
-          <a:xfrm>
-            <a:off x="2649946" y="10292455"/>
-            <a:ext cx="1052083" cy="369332"/>
-          </a:xfrm>
-          <a:prstGeom prst="rect">
-            <a:avLst/>
-          </a:prstGeom>
-          <a:solidFill>
-            <a:schemeClr val="bg1"/>
-          </a:solidFill>
-          <a:ln>
-            <a:solidFill>
-              <a:schemeClr val="tx1"/>
-            </a:solidFill>
-          </a:ln>
-        </p:spPr>
-        <p:txBody>
-          <a:bodyPr wrap="none" lIns="0" tIns="0" rIns="0" bIns="0" rtlCol="0">
-            <a:spAutoFit/>
-          </a:bodyPr>
-          <a:lstStyle/>
-          <a:p>
-            <a:r>
-              <a:rPr lang="de-DE" sz="1200" dirty="0" err="1" smtClean="0"/>
-              <a:t>Use</a:t>
-            </a:r>
-            <a:r>
-              <a:rPr lang="de-DE" sz="1200" dirty="0" smtClean="0"/>
-              <a:t> </a:t>
-            </a:r>
-            <a:r>
-              <a:rPr lang="de-DE" sz="1200" dirty="0" err="1" smtClean="0"/>
-              <a:t>output</a:t>
-            </a:r>
-            <a:r>
-              <a:rPr lang="de-DE" sz="1200" dirty="0" smtClean="0"/>
-              <a:t> </a:t>
-            </a:r>
-            <a:r>
-              <a:rPr lang="de-DE" sz="1200" dirty="0" err="1" smtClean="0"/>
-              <a:t>as</a:t>
-            </a:r>
-            <a:r>
-              <a:rPr lang="de-DE" sz="1200" dirty="0" smtClean="0"/>
-              <a:t> </a:t>
-            </a:r>
-            <a:br>
-              <a:rPr lang="de-DE" sz="1200" dirty="0" smtClean="0"/>
-            </a:br>
-            <a:r>
-              <a:rPr lang="de-DE" sz="1200" dirty="0" err="1" smtClean="0"/>
-              <a:t>fixed</a:t>
-            </a:r>
-            <a:r>
-              <a:rPr lang="de-DE" sz="1200" dirty="0" smtClean="0"/>
-              <a:t> </a:t>
-            </a:r>
-            <a:r>
-              <a:rPr lang="de-DE" sz="1200" dirty="0" err="1" smtClean="0"/>
-              <a:t>parameters</a:t>
-            </a:r>
-            <a:endParaRPr lang="de-DE" sz="1200" dirty="0"/>
-          </a:p>
-        </p:txBody>
-      </p:sp>
-      <p:cxnSp>
-        <p:nvCxnSpPr>
-          <p:cNvPr id="117" name="Gewinkelter Verbinder 116"/>
-          <p:cNvCxnSpPr>
-            <a:stCxn id="71" idx="3"/>
-            <a:endCxn id="89" idx="1"/>
-          </p:cNvCxnSpPr>
-          <p:nvPr/>
-        </p:nvCxnSpPr>
-        <p:spPr>
-          <a:xfrm flipH="1" flipV="1">
-            <a:off x="2435656" y="10002178"/>
-            <a:ext cx="5876878" cy="457436"/>
-          </a:xfrm>
-          <a:prstGeom prst="bentConnector5">
-            <a:avLst>
-              <a:gd name="adj1" fmla="val -47488"/>
-              <a:gd name="adj2" fmla="val 62494"/>
-              <a:gd name="adj3" fmla="val 103890"/>
-            </a:avLst>
-          </a:prstGeom>
-          <a:ln>
-            <a:solidFill>
-              <a:schemeClr val="tx1"/>
-            </a:solidFill>
-            <a:tailEnd type="triangle"/>
-          </a:ln>
-        </p:spPr>
-        <p:style>
-          <a:lnRef idx="1">
-            <a:schemeClr val="accent1"/>
-          </a:lnRef>
-          <a:fillRef idx="0">
-            <a:schemeClr val="accent1"/>
-          </a:fillRef>
-          <a:effectRef idx="0">
-            <a:schemeClr val="accent1"/>
-          </a:effectRef>
-          <a:fontRef idx="minor">
-            <a:schemeClr val="tx1"/>
-          </a:fontRef>
-        </p:style>
-      </p:cxnSp>
-      <p:sp>
-        <p:nvSpPr>
-          <p:cNvPr id="116" name="Textfeld 115"/>
-          <p:cNvSpPr txBox="1"/>
-          <p:nvPr/>
-        </p:nvSpPr>
-        <p:spPr>
-          <a:xfrm>
-            <a:off x="8672702" y="10282245"/>
-            <a:ext cx="1989840" cy="369332"/>
-          </a:xfrm>
-          <a:prstGeom prst="rect">
-            <a:avLst/>
-          </a:prstGeom>
-          <a:solidFill>
-            <a:schemeClr val="bg1"/>
-          </a:solidFill>
-          <a:ln>
-            <a:solidFill>
-              <a:schemeClr val="tx1"/>
-            </a:solidFill>
-          </a:ln>
-        </p:spPr>
-        <p:txBody>
-          <a:bodyPr wrap="none" lIns="0" tIns="0" rIns="0" bIns="0" rtlCol="0">
-            <a:spAutoFit/>
-          </a:bodyPr>
-          <a:lstStyle/>
-          <a:p>
-            <a:r>
-              <a:rPr lang="de-DE" sz="1200" dirty="0" err="1" smtClean="0"/>
-              <a:t>Use</a:t>
-            </a:r>
-            <a:r>
-              <a:rPr lang="de-DE" sz="1200" dirty="0" smtClean="0"/>
-              <a:t> </a:t>
-            </a:r>
-            <a:r>
-              <a:rPr lang="de-DE" sz="1200" dirty="0" err="1" smtClean="0"/>
-              <a:t>output</a:t>
-            </a:r>
-            <a:r>
-              <a:rPr lang="de-DE" sz="1200" dirty="0" smtClean="0"/>
-              <a:t> </a:t>
-            </a:r>
-            <a:r>
-              <a:rPr lang="de-DE" sz="1200" dirty="0" err="1" smtClean="0"/>
-              <a:t>as</a:t>
-            </a:r>
-            <a:r>
-              <a:rPr lang="de-DE" sz="1200" dirty="0" smtClean="0"/>
-              <a:t> </a:t>
-            </a:r>
-            <a:r>
-              <a:rPr lang="de-DE" sz="1200" dirty="0" err="1" smtClean="0"/>
-              <a:t>fixed</a:t>
-            </a:r>
-            <a:r>
-              <a:rPr lang="de-DE" sz="1200" dirty="0" smtClean="0"/>
-              <a:t> </a:t>
-            </a:r>
-            <a:r>
-              <a:rPr lang="de-DE" sz="1200" dirty="0" err="1" smtClean="0"/>
-              <a:t>parameters</a:t>
-            </a:r>
-            <a:r>
-              <a:rPr lang="de-DE" sz="1200" dirty="0" smtClean="0"/>
-              <a:t> </a:t>
-            </a:r>
-          </a:p>
-          <a:p>
-            <a:r>
-              <a:rPr lang="de-DE" sz="1200" dirty="0" err="1" smtClean="0"/>
-              <a:t>and</a:t>
-            </a:r>
-            <a:r>
-              <a:rPr lang="de-DE" sz="1200" dirty="0" smtClean="0"/>
-              <a:t> </a:t>
-            </a:r>
-            <a:r>
-              <a:rPr lang="de-DE" sz="1200" dirty="0" err="1" smtClean="0"/>
-              <a:t>re</a:t>
-            </a:r>
-            <a:r>
-              <a:rPr lang="de-DE" sz="1200" dirty="0" smtClean="0"/>
-              <a:t>-run </a:t>
-            </a:r>
-            <a:r>
-              <a:rPr lang="de-DE" sz="1200" dirty="0" err="1" smtClean="0"/>
-              <a:t>first</a:t>
-            </a:r>
-            <a:r>
-              <a:rPr lang="de-DE" sz="1200" dirty="0" smtClean="0"/>
-              <a:t> </a:t>
-            </a:r>
-            <a:r>
-              <a:rPr lang="de-DE" sz="1200" dirty="0" err="1" smtClean="0"/>
-              <a:t>class</a:t>
-            </a:r>
-            <a:endParaRPr lang="de-DE" sz="1200" dirty="0"/>
           </a:p>
         </p:txBody>
       </p:sp>
@@ -8007,7 +7138,7 @@
         </p:nvSpPr>
         <p:spPr>
           <a:xfrm rot="5400000">
-            <a:off x="2181029" y="5814741"/>
+            <a:off x="2181029" y="5703370"/>
             <a:ext cx="137448" cy="310004"/>
           </a:xfrm>
           <a:prstGeom prst="rightBrace">
@@ -8053,7 +7184,7 @@
             </p:nvSpPr>
             <p:spPr>
               <a:xfrm>
-                <a:off x="1127367" y="5996962"/>
+                <a:off x="1127367" y="5885591"/>
                 <a:ext cx="2231136" cy="369332"/>
               </a:xfrm>
               <a:prstGeom prst="rect">
@@ -8102,7 +7233,7 @@
             </p:nvSpPr>
             <p:spPr>
               <a:xfrm>
-                <a:off x="1127367" y="5996962"/>
+                <a:off x="1127367" y="5885591"/>
                 <a:ext cx="2231136" cy="369332"/>
               </a:xfrm>
               <a:prstGeom prst="rect">
@@ -8141,8 +7272,8 @@
         </p:nvCxnSpPr>
         <p:spPr>
           <a:xfrm rot="16200000" flipH="1">
-            <a:off x="415852" y="6338141"/>
-            <a:ext cx="462402" cy="439973"/>
+            <a:off x="394941" y="10159515"/>
+            <a:ext cx="504225" cy="439973"/>
           </a:xfrm>
           <a:prstGeom prst="bentConnector2">
             <a:avLst/>
@@ -8169,45 +7300,247 @@
           </a:fontRef>
         </p:style>
       </p:cxnSp>
-      <p:cxnSp>
-        <p:nvCxnSpPr>
-          <p:cNvPr id="120" name="Gewinkelter Verbinder 119"/>
-          <p:cNvCxnSpPr>
-            <a:stCxn id="125" idx="2"/>
-            <a:endCxn id="153" idx="1"/>
-          </p:cNvCxnSpPr>
-          <p:nvPr/>
-        </p:nvCxnSpPr>
-        <p:spPr>
-          <a:xfrm rot="16200000" flipH="1">
-            <a:off x="435691" y="10741267"/>
-            <a:ext cx="435629" cy="452876"/>
-          </a:xfrm>
-          <a:prstGeom prst="bentConnector2">
-            <a:avLst/>
-          </a:prstGeom>
+      <p:sp>
+        <p:nvSpPr>
+          <p:cNvPr id="7" name="Rechteck 6"/>
+          <p:cNvSpPr/>
+          <p:nvPr/>
+        </p:nvSpPr>
+        <p:spPr>
+          <a:xfrm>
+            <a:off x="0" y="8517290"/>
+            <a:ext cx="12166191" cy="2938709"/>
+          </a:xfrm>
+          <a:prstGeom prst="rect">
+            <a:avLst/>
+          </a:prstGeom>
+          <a:solidFill>
+            <a:schemeClr val="dk1">
+              <a:alpha val="50000"/>
+            </a:schemeClr>
+          </a:solidFill>
+          <a:ln>
+            <a:noFill/>
+          </a:ln>
+        </p:spPr>
+        <p:style>
+          <a:lnRef idx="0">
+            <a:scrgbClr r="0" g="0" b="0"/>
+          </a:lnRef>
+          <a:fillRef idx="0">
+            <a:scrgbClr r="0" g="0" b="0"/>
+          </a:fillRef>
+          <a:effectRef idx="0">
+            <a:scrgbClr r="0" g="0" b="0"/>
+          </a:effectRef>
+          <a:fontRef idx="minor">
+            <a:schemeClr val="lt1"/>
+          </a:fontRef>
+        </p:style>
+        <p:txBody>
+          <a:bodyPr rtlCol="0" anchor="ctr"/>
+          <a:lstStyle/>
+          <a:p>
+            <a:pPr algn="ctr"/>
+            <a:r>
+              <a:rPr lang="de-DE" sz="3600" b="1" dirty="0" err="1" smtClean="0"/>
+              <a:t>Currently</a:t>
+            </a:r>
+            <a:r>
+              <a:rPr lang="de-DE" sz="3600" b="1" dirty="0" smtClean="0"/>
+              <a:t> </a:t>
+            </a:r>
+            <a:r>
+              <a:rPr lang="de-DE" sz="3600" b="1" dirty="0" err="1" smtClean="0"/>
+              <a:t>disregarded</a:t>
+            </a:r>
+            <a:r>
+              <a:rPr lang="de-DE" sz="3600" b="1" dirty="0" smtClean="0"/>
+              <a:t> </a:t>
+            </a:r>
+            <a:r>
+              <a:rPr lang="de-DE" sz="3600" b="1" dirty="0" err="1" smtClean="0"/>
+              <a:t>options</a:t>
+            </a:r>
+            <a:endParaRPr lang="de-DE" sz="3600" b="1" dirty="0"/>
+          </a:p>
+        </p:txBody>
+      </p:sp>
+      <p:sp>
+        <p:nvSpPr>
+          <p:cNvPr id="122" name="Rechteck 121"/>
+          <p:cNvSpPr/>
+          <p:nvPr/>
+        </p:nvSpPr>
+        <p:spPr>
+          <a:xfrm>
+            <a:off x="0" y="3726682"/>
+            <a:ext cx="854134" cy="1668450"/>
+          </a:xfrm>
+          <a:prstGeom prst="rect">
+            <a:avLst/>
+          </a:prstGeom>
+          <a:solidFill>
+            <a:srgbClr val="D9D9D9"/>
+          </a:solidFill>
+          <a:ln>
+            <a:solidFill>
+              <a:srgbClr val="D9D9D9"/>
+            </a:solidFill>
+          </a:ln>
+        </p:spPr>
+        <p:style>
+          <a:lnRef idx="2">
+            <a:schemeClr val="accent1">
+              <a:shade val="50000"/>
+            </a:schemeClr>
+          </a:lnRef>
+          <a:fillRef idx="1">
+            <a:schemeClr val="accent1"/>
+          </a:fillRef>
+          <a:effectRef idx="0">
+            <a:schemeClr val="accent1"/>
+          </a:effectRef>
+          <a:fontRef idx="minor">
+            <a:schemeClr val="lt1"/>
+          </a:fontRef>
+        </p:style>
+        <p:txBody>
+          <a:bodyPr vert="vert270" rtlCol="0" anchor="ctr"/>
+          <a:lstStyle/>
+          <a:p>
+            <a:pPr algn="ctr"/>
+            <a:r>
+              <a:rPr lang="en-US" dirty="0" smtClean="0">
+                <a:solidFill>
+                  <a:sysClr val="windowText" lastClr="000000"/>
+                </a:solidFill>
+              </a:rPr>
+              <a:t>Multiple</a:t>
+            </a:r>
+            <a:endParaRPr lang="en-US" dirty="0">
+              <a:solidFill>
+                <a:sysClr val="windowText" lastClr="000000"/>
+              </a:solidFill>
+            </a:endParaRPr>
+          </a:p>
+        </p:txBody>
+      </p:sp>
+      <p:sp>
+        <p:nvSpPr>
+          <p:cNvPr id="123" name="Rechteck 122"/>
+          <p:cNvSpPr/>
+          <p:nvPr/>
+        </p:nvSpPr>
+        <p:spPr>
+          <a:xfrm>
+            <a:off x="0" y="5493807"/>
+            <a:ext cx="854134" cy="761116"/>
+          </a:xfrm>
+          <a:prstGeom prst="rect">
+            <a:avLst/>
+          </a:prstGeom>
+          <a:solidFill>
+            <a:srgbClr val="D9D9D9"/>
+          </a:solidFill>
+          <a:ln>
+            <a:solidFill>
+              <a:srgbClr val="D9D9D9"/>
+            </a:solidFill>
+          </a:ln>
+        </p:spPr>
+        <p:style>
+          <a:lnRef idx="2">
+            <a:schemeClr val="accent1">
+              <a:shade val="50000"/>
+            </a:schemeClr>
+          </a:lnRef>
+          <a:fillRef idx="1">
+            <a:schemeClr val="accent1"/>
+          </a:fillRef>
+          <a:effectRef idx="0">
+            <a:schemeClr val="accent1"/>
+          </a:effectRef>
+          <a:fontRef idx="minor">
+            <a:schemeClr val="lt1"/>
+          </a:fontRef>
+        </p:style>
+        <p:txBody>
+          <a:bodyPr vert="vert270" rtlCol="0" anchor="ctr"/>
+          <a:lstStyle/>
+          <a:p>
+            <a:pPr algn="ctr"/>
+            <a:r>
+              <a:rPr lang="en-US" dirty="0" smtClean="0">
+                <a:solidFill>
+                  <a:sysClr val="windowText" lastClr="000000"/>
+                </a:solidFill>
+              </a:rPr>
+              <a:t>Single</a:t>
+            </a:r>
+            <a:endParaRPr lang="en-US" dirty="0">
+              <a:solidFill>
+                <a:sysClr val="windowText" lastClr="000000"/>
+              </a:solidFill>
+            </a:endParaRPr>
+          </a:p>
+        </p:txBody>
+      </p:sp>
+      <p:sp>
+        <p:nvSpPr>
+          <p:cNvPr id="126" name="Rechteck 125"/>
+          <p:cNvSpPr/>
+          <p:nvPr/>
+        </p:nvSpPr>
+        <p:spPr>
+          <a:xfrm>
+            <a:off x="2004004" y="3858476"/>
+            <a:ext cx="421805" cy="182408"/>
+          </a:xfrm>
+          <a:prstGeom prst="rect">
+            <a:avLst/>
+          </a:prstGeom>
+          <a:solidFill>
+            <a:schemeClr val="bg1">
+              <a:lumMod val="85000"/>
+            </a:schemeClr>
+          </a:solidFill>
           <a:ln>
             <a:solidFill>
               <a:schemeClr val="tx1"/>
             </a:solidFill>
-            <a:tailEnd type="triangle"/>
           </a:ln>
         </p:spPr>
         <p:style>
-          <a:lnRef idx="1">
-            <a:schemeClr val="accent1"/>
+          <a:lnRef idx="2">
+            <a:schemeClr val="accent1">
+              <a:shade val="50000"/>
+            </a:schemeClr>
           </a:lnRef>
-          <a:fillRef idx="0">
+          <a:fillRef idx="1">
             <a:schemeClr val="accent1"/>
           </a:fillRef>
           <a:effectRef idx="0">
             <a:schemeClr val="accent1"/>
           </a:effectRef>
           <a:fontRef idx="minor">
-            <a:schemeClr val="tx1"/>
+            <a:schemeClr val="lt1"/>
           </a:fontRef>
         </p:style>
-      </p:cxnSp>
+        <p:txBody>
+          <a:bodyPr rot="0" spcFirstLastPara="0" vertOverflow="overflow" horzOverflow="overflow" vert="horz" wrap="square" lIns="91440" tIns="45720" rIns="91440" bIns="45720" numCol="1" spcCol="0" rtlCol="0" fromWordArt="0" anchor="ctr" anchorCtr="0" forceAA="0" compatLnSpc="1">
+            <a:prstTxWarp prst="textNoShape">
+              <a:avLst/>
+            </a:prstTxWarp>
+            <a:noAutofit/>
+          </a:bodyPr>
+          <a:lstStyle/>
+          <a:p>
+            <a:pPr algn="ctr"/>
+            <a:endParaRPr lang="en-US" dirty="0"/>
+          </a:p>
+        </p:txBody>
+      </p:sp>
     </p:spTree>
     <p:extLst>
       <p:ext uri="{BB962C8B-B14F-4D97-AF65-F5344CB8AC3E}">
@@ -9856,6 +9189,13 @@
   <p:clrMapOvr>
     <a:masterClrMapping/>
   </p:clrMapOvr>
+  <p:timing>
+    <p:tnLst>
+      <p:par>
+        <p:cTn id="1" dur="indefinite" restart="never" nodeType="tmRoot"/>
+      </p:par>
+    </p:tnLst>
+  </p:timing>
 </p:sld>
 </file>
 

</xml_diff>